<commit_message>
some minor changes to figs
</commit_message>
<xml_diff>
--- a/figs/app_figs.pptx
+++ b/figs/app_figs.pptx
@@ -244,7 +244,7 @@
           <a:p>
             <a:fld id="{71DC268A-E152-4BEA-BC4B-41FCC1567254}" type="datetimeFigureOut">
               <a:rPr lang="en-US" smtClean="0"/>
-              <a:t>2/7/2019</a:t>
+              <a:t>3/29/2019</a:t>
             </a:fld>
             <a:endParaRPr lang="en-US"/>
           </a:p>
@@ -414,7 +414,7 @@
           <a:p>
             <a:fld id="{71DC268A-E152-4BEA-BC4B-41FCC1567254}" type="datetimeFigureOut">
               <a:rPr lang="en-US" smtClean="0"/>
-              <a:t>2/7/2019</a:t>
+              <a:t>3/29/2019</a:t>
             </a:fld>
             <a:endParaRPr lang="en-US"/>
           </a:p>
@@ -594,7 +594,7 @@
           <a:p>
             <a:fld id="{71DC268A-E152-4BEA-BC4B-41FCC1567254}" type="datetimeFigureOut">
               <a:rPr lang="en-US" smtClean="0"/>
-              <a:t>2/7/2019</a:t>
+              <a:t>3/29/2019</a:t>
             </a:fld>
             <a:endParaRPr lang="en-US"/>
           </a:p>
@@ -764,7 +764,7 @@
           <a:p>
             <a:fld id="{71DC268A-E152-4BEA-BC4B-41FCC1567254}" type="datetimeFigureOut">
               <a:rPr lang="en-US" smtClean="0"/>
-              <a:t>2/7/2019</a:t>
+              <a:t>3/29/2019</a:t>
             </a:fld>
             <a:endParaRPr lang="en-US"/>
           </a:p>
@@ -1010,7 +1010,7 @@
           <a:p>
             <a:fld id="{71DC268A-E152-4BEA-BC4B-41FCC1567254}" type="datetimeFigureOut">
               <a:rPr lang="en-US" smtClean="0"/>
-              <a:t>2/7/2019</a:t>
+              <a:t>3/29/2019</a:t>
             </a:fld>
             <a:endParaRPr lang="en-US"/>
           </a:p>
@@ -1242,7 +1242,7 @@
           <a:p>
             <a:fld id="{71DC268A-E152-4BEA-BC4B-41FCC1567254}" type="datetimeFigureOut">
               <a:rPr lang="en-US" smtClean="0"/>
-              <a:t>2/7/2019</a:t>
+              <a:t>3/29/2019</a:t>
             </a:fld>
             <a:endParaRPr lang="en-US"/>
           </a:p>
@@ -1609,7 +1609,7 @@
           <a:p>
             <a:fld id="{71DC268A-E152-4BEA-BC4B-41FCC1567254}" type="datetimeFigureOut">
               <a:rPr lang="en-US" smtClean="0"/>
-              <a:t>2/7/2019</a:t>
+              <a:t>3/29/2019</a:t>
             </a:fld>
             <a:endParaRPr lang="en-US"/>
           </a:p>
@@ -1727,7 +1727,7 @@
           <a:p>
             <a:fld id="{71DC268A-E152-4BEA-BC4B-41FCC1567254}" type="datetimeFigureOut">
               <a:rPr lang="en-US" smtClean="0"/>
-              <a:t>2/7/2019</a:t>
+              <a:t>3/29/2019</a:t>
             </a:fld>
             <a:endParaRPr lang="en-US"/>
           </a:p>
@@ -1822,7 +1822,7 @@
           <a:p>
             <a:fld id="{71DC268A-E152-4BEA-BC4B-41FCC1567254}" type="datetimeFigureOut">
               <a:rPr lang="en-US" smtClean="0"/>
-              <a:t>2/7/2019</a:t>
+              <a:t>3/29/2019</a:t>
             </a:fld>
             <a:endParaRPr lang="en-US"/>
           </a:p>
@@ -2099,7 +2099,7 @@
           <a:p>
             <a:fld id="{71DC268A-E152-4BEA-BC4B-41FCC1567254}" type="datetimeFigureOut">
               <a:rPr lang="en-US" smtClean="0"/>
-              <a:t>2/7/2019</a:t>
+              <a:t>3/29/2019</a:t>
             </a:fld>
             <a:endParaRPr lang="en-US"/>
           </a:p>
@@ -2356,7 +2356,7 @@
           <a:p>
             <a:fld id="{71DC268A-E152-4BEA-BC4B-41FCC1567254}" type="datetimeFigureOut">
               <a:rPr lang="en-US" smtClean="0"/>
-              <a:t>2/7/2019</a:t>
+              <a:t>3/29/2019</a:t>
             </a:fld>
             <a:endParaRPr lang="en-US"/>
           </a:p>
@@ -2569,7 +2569,7 @@
           <a:p>
             <a:fld id="{71DC268A-E152-4BEA-BC4B-41FCC1567254}" type="datetimeFigureOut">
               <a:rPr lang="en-US" smtClean="0"/>
-              <a:t>2/7/2019</a:t>
+              <a:t>3/29/2019</a:t>
             </a:fld>
             <a:endParaRPr lang="en-US"/>
           </a:p>
@@ -4051,7 +4051,7 @@
                   <a:latin typeface="Times New Roman" panose="02020603050405020304" pitchFamily="18" charset="0"/>
                   <a:cs typeface="Times New Roman" panose="02020603050405020304" pitchFamily="18" charset="0"/>
                 </a:rPr>
-                <a:t>CRAM metrics</a:t>
+                <a:t>CRAM</a:t>
               </a:r>
             </a:p>
             <a:p>
@@ -4064,7 +4064,7 @@
                   <a:latin typeface="Times New Roman" panose="02020603050405020304" pitchFamily="18" charset="0"/>
                   <a:cs typeface="Times New Roman" panose="02020603050405020304" pitchFamily="18" charset="0"/>
                 </a:rPr>
-                <a:t>PHAB metrics</a:t>
+                <a:t>IPI</a:t>
               </a:r>
             </a:p>
           </p:txBody>
@@ -4463,7 +4463,7 @@
             <p:nvPr>
               <p:extLst>
                 <p:ext uri="{D42A27DB-BD31-4B8C-83A1-F6EECF244321}">
-                  <p14:modId xmlns:p14="http://schemas.microsoft.com/office/powerpoint/2010/main" val="1138259753"/>
+                  <p14:modId xmlns:p14="http://schemas.microsoft.com/office/powerpoint/2010/main" val="1992811830"/>
                 </p:ext>
               </p:extLst>
             </p:nvPr>
@@ -4512,6 +4512,8 @@
                           <a:solidFill>
                             <a:schemeClr val="tx1"/>
                           </a:solidFill>
+                          <a:latin typeface="Times New Roman" panose="02020603050405020304" pitchFamily="18" charset="0"/>
+                          <a:cs typeface="Times New Roman" panose="02020603050405020304" pitchFamily="18" charset="0"/>
                         </a:endParaRPr>
                       </a:p>
                     </a:txBody>
@@ -4530,6 +4532,8 @@
                             <a:solidFill>
                               <a:schemeClr val="tx1"/>
                             </a:solidFill>
+                            <a:latin typeface="Times New Roman" panose="02020603050405020304" pitchFamily="18" charset="0"/>
+                            <a:cs typeface="Times New Roman" panose="02020603050405020304" pitchFamily="18" charset="0"/>
                           </a:rPr>
                           <a:t>Chemistry stress</a:t>
                         </a:r>
@@ -4541,6 +4545,8 @@
                             <a:solidFill>
                               <a:schemeClr val="tx1"/>
                             </a:solidFill>
+                            <a:latin typeface="Times New Roman" panose="02020603050405020304" pitchFamily="18" charset="0"/>
+                            <a:cs typeface="Times New Roman" panose="02020603050405020304" pitchFamily="18" charset="0"/>
                           </a:rPr>
                           <a:t>low</a:t>
                         </a:r>
@@ -4561,6 +4567,8 @@
                             <a:solidFill>
                               <a:schemeClr val="tx1"/>
                             </a:solidFill>
+                            <a:latin typeface="Times New Roman" panose="02020603050405020304" pitchFamily="18" charset="0"/>
+                            <a:cs typeface="Times New Roman" panose="02020603050405020304" pitchFamily="18" charset="0"/>
                           </a:rPr>
                           <a:t>Chemistry stress high</a:t>
                         </a:r>
@@ -4588,6 +4596,8 @@
                             <a:solidFill>
                               <a:schemeClr val="tx1"/>
                             </a:solidFill>
+                            <a:latin typeface="Times New Roman" panose="02020603050405020304" pitchFamily="18" charset="0"/>
+                            <a:cs typeface="Times New Roman" panose="02020603050405020304" pitchFamily="18" charset="0"/>
                           </a:rPr>
                           <a:t>Habitat stress low</a:t>
                         </a:r>
@@ -4604,7 +4614,10 @@
                       <a:p>
                         <a:pPr algn="ctr"/>
                         <a:r>
-                          <a:rPr lang="en-US" sz="2000" b="0" dirty="0"/>
+                          <a:rPr lang="en-US" sz="2000" b="0" dirty="0">
+                            <a:latin typeface="Times New Roman" panose="02020603050405020304" pitchFamily="18" charset="0"/>
+                            <a:cs typeface="Times New Roman" panose="02020603050405020304" pitchFamily="18" charset="0"/>
+                          </a:rPr>
                           <a:t>Low stress</a:t>
                         </a:r>
                       </a:p>
@@ -4622,7 +4635,10 @@
                       <a:p>
                         <a:pPr algn="ctr"/>
                         <a:r>
-                          <a:rPr lang="en-US" sz="2000" b="0" dirty="0"/>
+                          <a:rPr lang="en-US" sz="2000" b="0" dirty="0">
+                            <a:latin typeface="Times New Roman" panose="02020603050405020304" pitchFamily="18" charset="0"/>
+                            <a:cs typeface="Times New Roman" panose="02020603050405020304" pitchFamily="18" charset="0"/>
+                          </a:rPr>
                           <a:t>Stressed by chemistry degradation</a:t>
                         </a:r>
                       </a:p>
@@ -4651,6 +4667,8 @@
                             <a:solidFill>
                               <a:schemeClr val="tx1"/>
                             </a:solidFill>
+                            <a:latin typeface="Times New Roman" panose="02020603050405020304" pitchFamily="18" charset="0"/>
+                            <a:cs typeface="Times New Roman" panose="02020603050405020304" pitchFamily="18" charset="0"/>
                           </a:rPr>
                           <a:t>Habitat stress high</a:t>
                         </a:r>
@@ -4667,7 +4685,10 @@
                       <a:p>
                         <a:pPr algn="ctr"/>
                         <a:r>
-                          <a:rPr lang="en-US" sz="2000" b="0" dirty="0"/>
+                          <a:rPr lang="en-US" sz="2000" b="0" dirty="0">
+                            <a:latin typeface="Times New Roman" panose="02020603050405020304" pitchFamily="18" charset="0"/>
+                            <a:cs typeface="Times New Roman" panose="02020603050405020304" pitchFamily="18" charset="0"/>
+                          </a:rPr>
                           <a:t>Stressed by  habitat degradation</a:t>
                         </a:r>
                       </a:p>
@@ -4685,7 +4706,10 @@
                       <a:p>
                         <a:pPr algn="ctr"/>
                         <a:r>
-                          <a:rPr lang="en-US" sz="2000" b="0" dirty="0"/>
+                          <a:rPr lang="en-US" sz="2000" b="0" dirty="0">
+                            <a:latin typeface="Times New Roman" panose="02020603050405020304" pitchFamily="18" charset="0"/>
+                            <a:cs typeface="Times New Roman" panose="02020603050405020304" pitchFamily="18" charset="0"/>
+                          </a:rPr>
                           <a:t>Stressed by chemistry and habitat degradation</a:t>
                         </a:r>
                       </a:p>

</xml_diff>

<commit_message>
fixing figs tables for new habglm
</commit_message>
<xml_diff>
--- a/figs/app_figs.pptx
+++ b/figs/app_figs.pptx
@@ -244,7 +244,7 @@
           <a:p>
             <a:fld id="{71DC268A-E152-4BEA-BC4B-41FCC1567254}" type="datetimeFigureOut">
               <a:rPr lang="en-US" smtClean="0"/>
-              <a:t>3/29/2019</a:t>
+              <a:t>4/7/2019</a:t>
             </a:fld>
             <a:endParaRPr lang="en-US"/>
           </a:p>
@@ -414,7 +414,7 @@
           <a:p>
             <a:fld id="{71DC268A-E152-4BEA-BC4B-41FCC1567254}" type="datetimeFigureOut">
               <a:rPr lang="en-US" smtClean="0"/>
-              <a:t>3/29/2019</a:t>
+              <a:t>4/7/2019</a:t>
             </a:fld>
             <a:endParaRPr lang="en-US"/>
           </a:p>
@@ -594,7 +594,7 @@
           <a:p>
             <a:fld id="{71DC268A-E152-4BEA-BC4B-41FCC1567254}" type="datetimeFigureOut">
               <a:rPr lang="en-US" smtClean="0"/>
-              <a:t>3/29/2019</a:t>
+              <a:t>4/7/2019</a:t>
             </a:fld>
             <a:endParaRPr lang="en-US"/>
           </a:p>
@@ -764,7 +764,7 @@
           <a:p>
             <a:fld id="{71DC268A-E152-4BEA-BC4B-41FCC1567254}" type="datetimeFigureOut">
               <a:rPr lang="en-US" smtClean="0"/>
-              <a:t>3/29/2019</a:t>
+              <a:t>4/7/2019</a:t>
             </a:fld>
             <a:endParaRPr lang="en-US"/>
           </a:p>
@@ -1010,7 +1010,7 @@
           <a:p>
             <a:fld id="{71DC268A-E152-4BEA-BC4B-41FCC1567254}" type="datetimeFigureOut">
               <a:rPr lang="en-US" smtClean="0"/>
-              <a:t>3/29/2019</a:t>
+              <a:t>4/7/2019</a:t>
             </a:fld>
             <a:endParaRPr lang="en-US"/>
           </a:p>
@@ -1242,7 +1242,7 @@
           <a:p>
             <a:fld id="{71DC268A-E152-4BEA-BC4B-41FCC1567254}" type="datetimeFigureOut">
               <a:rPr lang="en-US" smtClean="0"/>
-              <a:t>3/29/2019</a:t>
+              <a:t>4/7/2019</a:t>
             </a:fld>
             <a:endParaRPr lang="en-US"/>
           </a:p>
@@ -1609,7 +1609,7 @@
           <a:p>
             <a:fld id="{71DC268A-E152-4BEA-BC4B-41FCC1567254}" type="datetimeFigureOut">
               <a:rPr lang="en-US" smtClean="0"/>
-              <a:t>3/29/2019</a:t>
+              <a:t>4/7/2019</a:t>
             </a:fld>
             <a:endParaRPr lang="en-US"/>
           </a:p>
@@ -1727,7 +1727,7 @@
           <a:p>
             <a:fld id="{71DC268A-E152-4BEA-BC4B-41FCC1567254}" type="datetimeFigureOut">
               <a:rPr lang="en-US" smtClean="0"/>
-              <a:t>3/29/2019</a:t>
+              <a:t>4/7/2019</a:t>
             </a:fld>
             <a:endParaRPr lang="en-US"/>
           </a:p>
@@ -1822,7 +1822,7 @@
           <a:p>
             <a:fld id="{71DC268A-E152-4BEA-BC4B-41FCC1567254}" type="datetimeFigureOut">
               <a:rPr lang="en-US" smtClean="0"/>
-              <a:t>3/29/2019</a:t>
+              <a:t>4/7/2019</a:t>
             </a:fld>
             <a:endParaRPr lang="en-US"/>
           </a:p>
@@ -2099,7 +2099,7 @@
           <a:p>
             <a:fld id="{71DC268A-E152-4BEA-BC4B-41FCC1567254}" type="datetimeFigureOut">
               <a:rPr lang="en-US" smtClean="0"/>
-              <a:t>3/29/2019</a:t>
+              <a:t>4/7/2019</a:t>
             </a:fld>
             <a:endParaRPr lang="en-US"/>
           </a:p>
@@ -2356,7 +2356,7 @@
           <a:p>
             <a:fld id="{71DC268A-E152-4BEA-BC4B-41FCC1567254}" type="datetimeFigureOut">
               <a:rPr lang="en-US" smtClean="0"/>
-              <a:t>3/29/2019</a:t>
+              <a:t>4/7/2019</a:t>
             </a:fld>
             <a:endParaRPr lang="en-US"/>
           </a:p>
@@ -2569,7 +2569,7 @@
           <a:p>
             <a:fld id="{71DC268A-E152-4BEA-BC4B-41FCC1567254}" type="datetimeFigureOut">
               <a:rPr lang="en-US" smtClean="0"/>
-              <a:t>3/29/2019</a:t>
+              <a:t>4/7/2019</a:t>
             </a:fld>
             <a:endParaRPr lang="en-US"/>
           </a:p>
@@ -4051,7 +4051,7 @@
                   <a:latin typeface="Times New Roman" panose="02020603050405020304" pitchFamily="18" charset="0"/>
                   <a:cs typeface="Times New Roman" panose="02020603050405020304" pitchFamily="18" charset="0"/>
                 </a:rPr>
-                <a:t>CRAM</a:t>
+                <a:t>CRAM metrics</a:t>
               </a:r>
             </a:p>
             <a:p>
@@ -4064,7 +4064,7 @@
                   <a:latin typeface="Times New Roman" panose="02020603050405020304" pitchFamily="18" charset="0"/>
                   <a:cs typeface="Times New Roman" panose="02020603050405020304" pitchFamily="18" charset="0"/>
                 </a:rPr>
-                <a:t>IPI</a:t>
+                <a:t>IPI metrics</a:t>
               </a:r>
             </a:p>
           </p:txBody>

</xml_diff>

<commit_message>
added case study figure
</commit_message>
<xml_diff>
--- a/figs/app_figs.pptx
+++ b/figs/app_figs.pptx
@@ -7,6 +7,7 @@
   <p:sldIdLst>
     <p:sldId id="293" r:id="rId2"/>
     <p:sldId id="349" r:id="rId3"/>
+    <p:sldId id="350" r:id="rId4"/>
   </p:sldIdLst>
   <p:sldSz cx="18288000" cy="6858000"/>
   <p:notesSz cx="6858000" cy="9144000"/>
@@ -244,7 +245,7 @@
           <a:p>
             <a:fld id="{71DC268A-E152-4BEA-BC4B-41FCC1567254}" type="datetimeFigureOut">
               <a:rPr lang="en-US" smtClean="0"/>
-              <a:t>4/7/2019</a:t>
+              <a:t>4/22/2019</a:t>
             </a:fld>
             <a:endParaRPr lang="en-US"/>
           </a:p>
@@ -414,7 +415,7 @@
           <a:p>
             <a:fld id="{71DC268A-E152-4BEA-BC4B-41FCC1567254}" type="datetimeFigureOut">
               <a:rPr lang="en-US" smtClean="0"/>
-              <a:t>4/7/2019</a:t>
+              <a:t>4/22/2019</a:t>
             </a:fld>
             <a:endParaRPr lang="en-US"/>
           </a:p>
@@ -594,7 +595,7 @@
           <a:p>
             <a:fld id="{71DC268A-E152-4BEA-BC4B-41FCC1567254}" type="datetimeFigureOut">
               <a:rPr lang="en-US" smtClean="0"/>
-              <a:t>4/7/2019</a:t>
+              <a:t>4/22/2019</a:t>
             </a:fld>
             <a:endParaRPr lang="en-US"/>
           </a:p>
@@ -764,7 +765,7 @@
           <a:p>
             <a:fld id="{71DC268A-E152-4BEA-BC4B-41FCC1567254}" type="datetimeFigureOut">
               <a:rPr lang="en-US" smtClean="0"/>
-              <a:t>4/7/2019</a:t>
+              <a:t>4/22/2019</a:t>
             </a:fld>
             <a:endParaRPr lang="en-US"/>
           </a:p>
@@ -1010,7 +1011,7 @@
           <a:p>
             <a:fld id="{71DC268A-E152-4BEA-BC4B-41FCC1567254}" type="datetimeFigureOut">
               <a:rPr lang="en-US" smtClean="0"/>
-              <a:t>4/7/2019</a:t>
+              <a:t>4/22/2019</a:t>
             </a:fld>
             <a:endParaRPr lang="en-US"/>
           </a:p>
@@ -1242,7 +1243,7 @@
           <a:p>
             <a:fld id="{71DC268A-E152-4BEA-BC4B-41FCC1567254}" type="datetimeFigureOut">
               <a:rPr lang="en-US" smtClean="0"/>
-              <a:t>4/7/2019</a:t>
+              <a:t>4/22/2019</a:t>
             </a:fld>
             <a:endParaRPr lang="en-US"/>
           </a:p>
@@ -1609,7 +1610,7 @@
           <a:p>
             <a:fld id="{71DC268A-E152-4BEA-BC4B-41FCC1567254}" type="datetimeFigureOut">
               <a:rPr lang="en-US" smtClean="0"/>
-              <a:t>4/7/2019</a:t>
+              <a:t>4/22/2019</a:t>
             </a:fld>
             <a:endParaRPr lang="en-US"/>
           </a:p>
@@ -1727,7 +1728,7 @@
           <a:p>
             <a:fld id="{71DC268A-E152-4BEA-BC4B-41FCC1567254}" type="datetimeFigureOut">
               <a:rPr lang="en-US" smtClean="0"/>
-              <a:t>4/7/2019</a:t>
+              <a:t>4/22/2019</a:t>
             </a:fld>
             <a:endParaRPr lang="en-US"/>
           </a:p>
@@ -1822,7 +1823,7 @@
           <a:p>
             <a:fld id="{71DC268A-E152-4BEA-BC4B-41FCC1567254}" type="datetimeFigureOut">
               <a:rPr lang="en-US" smtClean="0"/>
-              <a:t>4/7/2019</a:t>
+              <a:t>4/22/2019</a:t>
             </a:fld>
             <a:endParaRPr lang="en-US"/>
           </a:p>
@@ -2099,7 +2100,7 @@
           <a:p>
             <a:fld id="{71DC268A-E152-4BEA-BC4B-41FCC1567254}" type="datetimeFigureOut">
               <a:rPr lang="en-US" smtClean="0"/>
-              <a:t>4/7/2019</a:t>
+              <a:t>4/22/2019</a:t>
             </a:fld>
             <a:endParaRPr lang="en-US"/>
           </a:p>
@@ -2356,7 +2357,7 @@
           <a:p>
             <a:fld id="{71DC268A-E152-4BEA-BC4B-41FCC1567254}" type="datetimeFigureOut">
               <a:rPr lang="en-US" smtClean="0"/>
-              <a:t>4/7/2019</a:t>
+              <a:t>4/22/2019</a:t>
             </a:fld>
             <a:endParaRPr lang="en-US"/>
           </a:p>
@@ -2569,7 +2570,7 @@
           <a:p>
             <a:fld id="{71DC268A-E152-4BEA-BC4B-41FCC1567254}" type="datetimeFigureOut">
               <a:rPr lang="en-US" smtClean="0"/>
-              <a:t>4/7/2019</a:t>
+              <a:t>4/22/2019</a:t>
             </a:fld>
             <a:endParaRPr lang="en-US"/>
           </a:p>
@@ -5269,6 +5270,626 @@
 </p:sld>
 </file>
 
+<file path=ppt/slides/slide3.xml><?xml version="1.0" encoding="utf-8"?>
+<p:sld xmlns:a="http://schemas.openxmlformats.org/drawingml/2006/main" xmlns:r="http://schemas.openxmlformats.org/officeDocument/2006/relationships" xmlns:p="http://schemas.openxmlformats.org/presentationml/2006/main">
+  <p:cSld>
+    <p:spTree>
+      <p:nvGrpSpPr>
+        <p:cNvPr id="1" name=""/>
+        <p:cNvGrpSpPr/>
+        <p:nvPr/>
+      </p:nvGrpSpPr>
+      <p:grpSpPr>
+        <a:xfrm>
+          <a:off x="0" y="0"/>
+          <a:ext cx="0" cy="0"/>
+          <a:chOff x="0" y="0"/>
+          <a:chExt cx="0" cy="0"/>
+        </a:xfrm>
+      </p:grpSpPr>
+      <p:grpSp>
+        <p:nvGrpSpPr>
+          <p:cNvPr id="39" name="Group 38">
+            <a:extLst>
+              <a:ext uri="{FF2B5EF4-FFF2-40B4-BE49-F238E27FC236}">
+                <a16:creationId xmlns:a16="http://schemas.microsoft.com/office/drawing/2014/main" id="{343530DC-FA2A-4786-805D-DE28C6BACB89}"/>
+              </a:ext>
+            </a:extLst>
+          </p:cNvPr>
+          <p:cNvGrpSpPr/>
+          <p:nvPr/>
+        </p:nvGrpSpPr>
+        <p:grpSpPr>
+          <a:xfrm>
+            <a:off x="1440180" y="-1850660"/>
+            <a:ext cx="15412462" cy="13149897"/>
+            <a:chOff x="1440180" y="-1850660"/>
+            <a:chExt cx="15412462" cy="13149897"/>
+          </a:xfrm>
+        </p:grpSpPr>
+        <p:grpSp>
+          <p:nvGrpSpPr>
+            <p:cNvPr id="35" name="Group 34">
+              <a:extLst>
+                <a:ext uri="{FF2B5EF4-FFF2-40B4-BE49-F238E27FC236}">
+                  <a16:creationId xmlns:a16="http://schemas.microsoft.com/office/drawing/2014/main" id="{B8AF829C-C944-4956-9F2F-F6A29F95A9AD}"/>
+                </a:ext>
+              </a:extLst>
+            </p:cNvPr>
+            <p:cNvGrpSpPr>
+              <a:grpSpLocks noChangeAspect="1"/>
+            </p:cNvGrpSpPr>
+            <p:nvPr/>
+          </p:nvGrpSpPr>
+          <p:grpSpPr>
+            <a:xfrm>
+              <a:off x="1440180" y="3099074"/>
+              <a:ext cx="15407640" cy="1610914"/>
+              <a:chOff x="2189747" y="3310208"/>
+              <a:chExt cx="15338112" cy="1603645"/>
+            </a:xfrm>
+          </p:grpSpPr>
+          <p:pic>
+            <p:nvPicPr>
+              <p:cNvPr id="20" name="Picture 19">
+                <a:extLst>
+                  <a:ext uri="{FF2B5EF4-FFF2-40B4-BE49-F238E27FC236}">
+                    <a16:creationId xmlns:a16="http://schemas.microsoft.com/office/drawing/2014/main" id="{F4D898DC-D6F6-4882-A94C-9ECE78389412}"/>
+                  </a:ext>
+                </a:extLst>
+              </p:cNvPr>
+              <p:cNvPicPr>
+                <a:picLocks noChangeAspect="1"/>
+              </p:cNvPicPr>
+              <p:nvPr/>
+            </p:nvPicPr>
+            <p:blipFill>
+              <a:blip r:embed="rId2"/>
+              <a:stretch>
+                <a:fillRect/>
+              </a:stretch>
+            </p:blipFill>
+            <p:spPr>
+              <a:xfrm>
+                <a:off x="2189747" y="3310208"/>
+                <a:ext cx="4331496" cy="1603645"/>
+              </a:xfrm>
+              <a:prstGeom prst="rect">
+                <a:avLst/>
+              </a:prstGeom>
+            </p:spPr>
+          </p:pic>
+          <p:pic>
+            <p:nvPicPr>
+              <p:cNvPr id="21" name="Picture 20">
+                <a:extLst>
+                  <a:ext uri="{FF2B5EF4-FFF2-40B4-BE49-F238E27FC236}">
+                    <a16:creationId xmlns:a16="http://schemas.microsoft.com/office/drawing/2014/main" id="{7A7A7149-235F-45CC-949F-2056DB7C1DF6}"/>
+                  </a:ext>
+                </a:extLst>
+              </p:cNvPr>
+              <p:cNvPicPr>
+                <a:picLocks noChangeAspect="1"/>
+              </p:cNvPicPr>
+              <p:nvPr/>
+            </p:nvPicPr>
+            <p:blipFill>
+              <a:blip r:embed="rId3"/>
+              <a:stretch>
+                <a:fillRect/>
+              </a:stretch>
+            </p:blipFill>
+            <p:spPr>
+              <a:xfrm>
+                <a:off x="6521243" y="3310208"/>
+                <a:ext cx="6675120" cy="1598385"/>
+              </a:xfrm>
+              <a:prstGeom prst="rect">
+                <a:avLst/>
+              </a:prstGeom>
+            </p:spPr>
+          </p:pic>
+          <p:pic>
+            <p:nvPicPr>
+              <p:cNvPr id="22" name="Picture 21">
+                <a:extLst>
+                  <a:ext uri="{FF2B5EF4-FFF2-40B4-BE49-F238E27FC236}">
+                    <a16:creationId xmlns:a16="http://schemas.microsoft.com/office/drawing/2014/main" id="{9CD6A48E-06F1-4E10-ACC6-B34E10C6DEB5}"/>
+                  </a:ext>
+                </a:extLst>
+              </p:cNvPr>
+              <p:cNvPicPr>
+                <a:picLocks noChangeAspect="1"/>
+              </p:cNvPicPr>
+              <p:nvPr/>
+            </p:nvPicPr>
+            <p:blipFill>
+              <a:blip r:embed="rId4"/>
+              <a:stretch>
+                <a:fillRect/>
+              </a:stretch>
+            </p:blipFill>
+            <p:spPr>
+              <a:xfrm>
+                <a:off x="13196363" y="3310208"/>
+                <a:ext cx="4331496" cy="1601836"/>
+              </a:xfrm>
+              <a:prstGeom prst="rect">
+                <a:avLst/>
+              </a:prstGeom>
+            </p:spPr>
+          </p:pic>
+        </p:grpSp>
+        <p:grpSp>
+          <p:nvGrpSpPr>
+            <p:cNvPr id="36" name="Group 35">
+              <a:extLst>
+                <a:ext uri="{FF2B5EF4-FFF2-40B4-BE49-F238E27FC236}">
+                  <a16:creationId xmlns:a16="http://schemas.microsoft.com/office/drawing/2014/main" id="{33F7D5E9-5A4A-49B9-BF1C-FCDD01C72B22}"/>
+                </a:ext>
+              </a:extLst>
+            </p:cNvPr>
+            <p:cNvGrpSpPr>
+              <a:grpSpLocks noChangeAspect="1"/>
+            </p:cNvGrpSpPr>
+            <p:nvPr/>
+          </p:nvGrpSpPr>
+          <p:grpSpPr>
+            <a:xfrm>
+              <a:off x="1445002" y="-1230308"/>
+              <a:ext cx="15407640" cy="4216141"/>
+              <a:chOff x="1445002" y="-1230308"/>
+              <a:chExt cx="15426330" cy="4221255"/>
+            </a:xfrm>
+          </p:grpSpPr>
+          <p:pic>
+            <p:nvPicPr>
+              <p:cNvPr id="16" name="Picture 15">
+                <a:extLst>
+                  <a:ext uri="{FF2B5EF4-FFF2-40B4-BE49-F238E27FC236}">
+                    <a16:creationId xmlns:a16="http://schemas.microsoft.com/office/drawing/2014/main" id="{D2ACF164-0D55-40F0-9964-59AE6A864133}"/>
+                  </a:ext>
+                </a:extLst>
+              </p:cNvPr>
+              <p:cNvPicPr>
+                <a:picLocks noChangeAspect="1"/>
+              </p:cNvPicPr>
+              <p:nvPr/>
+            </p:nvPicPr>
+            <p:blipFill>
+              <a:blip r:embed="rId5">
+                <a:extLst>
+                  <a:ext uri="{28A0092B-C50C-407E-A947-70E740481C1C}">
+                    <a14:useLocalDpi xmlns:a14="http://schemas.microsoft.com/office/drawing/2010/main" val="0"/>
+                  </a:ext>
+                </a:extLst>
+              </a:blip>
+              <a:stretch>
+                <a:fillRect/>
+              </a:stretch>
+            </p:blipFill>
+            <p:spPr>
+              <a:xfrm>
+                <a:off x="1445002" y="-1230308"/>
+                <a:ext cx="5524500" cy="4143375"/>
+              </a:xfrm>
+              <a:prstGeom prst="rect">
+                <a:avLst/>
+              </a:prstGeom>
+            </p:spPr>
+          </p:pic>
+          <p:pic>
+            <p:nvPicPr>
+              <p:cNvPr id="19" name="Picture 18">
+                <a:extLst>
+                  <a:ext uri="{FF2B5EF4-FFF2-40B4-BE49-F238E27FC236}">
+                    <a16:creationId xmlns:a16="http://schemas.microsoft.com/office/drawing/2014/main" id="{671306EB-8D61-40C2-B5B7-FBA18D19A4BC}"/>
+                  </a:ext>
+                </a:extLst>
+              </p:cNvPr>
+              <p:cNvPicPr>
+                <a:picLocks noChangeAspect="1"/>
+              </p:cNvPicPr>
+              <p:nvPr/>
+            </p:nvPicPr>
+            <p:blipFill>
+              <a:blip r:embed="rId6"/>
+              <a:stretch>
+                <a:fillRect/>
+              </a:stretch>
+            </p:blipFill>
+            <p:spPr>
+              <a:xfrm>
+                <a:off x="1550754" y="964540"/>
+                <a:ext cx="1824460" cy="1838325"/>
+              </a:xfrm>
+              <a:prstGeom prst="rect">
+                <a:avLst/>
+              </a:prstGeom>
+              <a:ln>
+                <a:solidFill>
+                  <a:schemeClr val="bg1"/>
+                </a:solidFill>
+              </a:ln>
+            </p:spPr>
+          </p:pic>
+          <p:pic>
+            <p:nvPicPr>
+              <p:cNvPr id="23" name="Picture 22">
+                <a:extLst>
+                  <a:ext uri="{FF2B5EF4-FFF2-40B4-BE49-F238E27FC236}">
+                    <a16:creationId xmlns:a16="http://schemas.microsoft.com/office/drawing/2014/main" id="{101128EC-217E-45C9-A8A9-56CA27516A3B}"/>
+                  </a:ext>
+                </a:extLst>
+              </p:cNvPr>
+              <p:cNvPicPr>
+                <a:picLocks noChangeAspect="1"/>
+              </p:cNvPicPr>
+              <p:nvPr/>
+            </p:nvPicPr>
+            <p:blipFill>
+              <a:blip r:embed="rId7"/>
+              <a:stretch>
+                <a:fillRect/>
+              </a:stretch>
+            </p:blipFill>
+            <p:spPr>
+              <a:xfrm>
+                <a:off x="7097045" y="-1230308"/>
+                <a:ext cx="9774287" cy="4221255"/>
+              </a:xfrm>
+              <a:prstGeom prst="rect">
+                <a:avLst/>
+              </a:prstGeom>
+            </p:spPr>
+          </p:pic>
+        </p:grpSp>
+        <p:grpSp>
+          <p:nvGrpSpPr>
+            <p:cNvPr id="34" name="Group 33">
+              <a:extLst>
+                <a:ext uri="{FF2B5EF4-FFF2-40B4-BE49-F238E27FC236}">
+                  <a16:creationId xmlns:a16="http://schemas.microsoft.com/office/drawing/2014/main" id="{89ECB5D5-7F50-481F-BE90-DEFFFB46C145}"/>
+                </a:ext>
+              </a:extLst>
+            </p:cNvPr>
+            <p:cNvGrpSpPr/>
+            <p:nvPr/>
+          </p:nvGrpSpPr>
+          <p:grpSpPr>
+            <a:xfrm>
+              <a:off x="1440180" y="5441971"/>
+              <a:ext cx="15407640" cy="5857266"/>
+              <a:chOff x="433328" y="3998181"/>
+              <a:chExt cx="15407640" cy="5857266"/>
+            </a:xfrm>
+          </p:grpSpPr>
+          <p:grpSp>
+            <p:nvGrpSpPr>
+              <p:cNvPr id="33" name="Group 32">
+                <a:extLst>
+                  <a:ext uri="{FF2B5EF4-FFF2-40B4-BE49-F238E27FC236}">
+                    <a16:creationId xmlns:a16="http://schemas.microsoft.com/office/drawing/2014/main" id="{1F2CF6D1-E9D2-4EA4-8966-0D7F7D6EA64B}"/>
+                  </a:ext>
+                </a:extLst>
+              </p:cNvPr>
+              <p:cNvGrpSpPr/>
+              <p:nvPr/>
+            </p:nvGrpSpPr>
+            <p:grpSpPr>
+              <a:xfrm>
+                <a:off x="438150" y="3998181"/>
+                <a:ext cx="15402818" cy="4143376"/>
+                <a:chOff x="438150" y="3998181"/>
+                <a:chExt cx="15402818" cy="4143376"/>
+              </a:xfrm>
+            </p:grpSpPr>
+            <p:pic>
+              <p:nvPicPr>
+                <p:cNvPr id="18" name="Picture 17">
+                  <a:extLst>
+                    <a:ext uri="{FF2B5EF4-FFF2-40B4-BE49-F238E27FC236}">
+                      <a16:creationId xmlns:a16="http://schemas.microsoft.com/office/drawing/2014/main" id="{8BDCE371-7538-490B-B682-11BE879EA5B8}"/>
+                    </a:ext>
+                  </a:extLst>
+                </p:cNvPr>
+                <p:cNvPicPr>
+                  <a:picLocks noChangeAspect="1"/>
+                </p:cNvPicPr>
+                <p:nvPr/>
+              </p:nvPicPr>
+              <p:blipFill>
+                <a:blip r:embed="rId8">
+                  <a:extLst>
+                    <a:ext uri="{28A0092B-C50C-407E-A947-70E740481C1C}">
+                      <a14:useLocalDpi xmlns:a14="http://schemas.microsoft.com/office/drawing/2010/main" val="0"/>
+                    </a:ext>
+                  </a:extLst>
+                </a:blip>
+                <a:stretch>
+                  <a:fillRect/>
+                </a:stretch>
+              </p:blipFill>
+              <p:spPr>
+                <a:xfrm>
+                  <a:off x="438150" y="3998182"/>
+                  <a:ext cx="5524500" cy="4143375"/>
+                </a:xfrm>
+                <a:prstGeom prst="rect">
+                  <a:avLst/>
+                </a:prstGeom>
+              </p:spPr>
+            </p:pic>
+            <p:pic>
+              <p:nvPicPr>
+                <p:cNvPr id="31" name="Picture 30">
+                  <a:extLst>
+                    <a:ext uri="{FF2B5EF4-FFF2-40B4-BE49-F238E27FC236}">
+                      <a16:creationId xmlns:a16="http://schemas.microsoft.com/office/drawing/2014/main" id="{A885F1EB-AC65-4DB1-9E4F-5DC0DF49DE57}"/>
+                    </a:ext>
+                  </a:extLst>
+                </p:cNvPr>
+                <p:cNvPicPr>
+                  <a:picLocks noChangeAspect="1"/>
+                </p:cNvPicPr>
+                <p:nvPr/>
+              </p:nvPicPr>
+              <p:blipFill>
+                <a:blip r:embed="rId9"/>
+                <a:stretch>
+                  <a:fillRect/>
+                </a:stretch>
+              </p:blipFill>
+              <p:spPr>
+                <a:xfrm>
+                  <a:off x="561587" y="4111424"/>
+                  <a:ext cx="1795885" cy="1838325"/>
+                </a:xfrm>
+                <a:prstGeom prst="rect">
+                  <a:avLst/>
+                </a:prstGeom>
+                <a:ln>
+                  <a:solidFill>
+                    <a:schemeClr val="bg1"/>
+                  </a:solidFill>
+                </a:ln>
+              </p:spPr>
+            </p:pic>
+            <p:pic>
+              <p:nvPicPr>
+                <p:cNvPr id="30" name="Picture 29">
+                  <a:extLst>
+                    <a:ext uri="{FF2B5EF4-FFF2-40B4-BE49-F238E27FC236}">
+                      <a16:creationId xmlns:a16="http://schemas.microsoft.com/office/drawing/2014/main" id="{5FDF7A9D-C0D4-4141-9DAB-F0E15C12A018}"/>
+                    </a:ext>
+                  </a:extLst>
+                </p:cNvPr>
+                <p:cNvPicPr>
+                  <a:picLocks noChangeAspect="1"/>
+                </p:cNvPicPr>
+                <p:nvPr/>
+              </p:nvPicPr>
+              <p:blipFill>
+                <a:blip r:embed="rId10"/>
+                <a:stretch>
+                  <a:fillRect/>
+                </a:stretch>
+              </p:blipFill>
+              <p:spPr>
+                <a:xfrm>
+                  <a:off x="6090194" y="3998181"/>
+                  <a:ext cx="9750774" cy="4143375"/>
+                </a:xfrm>
+                <a:prstGeom prst="rect">
+                  <a:avLst/>
+                </a:prstGeom>
+              </p:spPr>
+            </p:pic>
+          </p:grpSp>
+          <p:grpSp>
+            <p:nvGrpSpPr>
+              <p:cNvPr id="26" name="Group 25">
+                <a:extLst>
+                  <a:ext uri="{FF2B5EF4-FFF2-40B4-BE49-F238E27FC236}">
+                    <a16:creationId xmlns:a16="http://schemas.microsoft.com/office/drawing/2014/main" id="{F5E41119-E0CD-4D3A-93D1-321E57F56FF1}"/>
+                  </a:ext>
+                </a:extLst>
+              </p:cNvPr>
+              <p:cNvGrpSpPr>
+                <a:grpSpLocks noChangeAspect="1"/>
+              </p:cNvGrpSpPr>
+              <p:nvPr/>
+            </p:nvGrpSpPr>
+            <p:grpSpPr>
+              <a:xfrm>
+                <a:off x="433328" y="8254798"/>
+                <a:ext cx="15407640" cy="1600649"/>
+                <a:chOff x="212880" y="4684545"/>
+                <a:chExt cx="10505921" cy="1091426"/>
+              </a:xfrm>
+            </p:grpSpPr>
+            <p:pic>
+              <p:nvPicPr>
+                <p:cNvPr id="27" name="Picture 26">
+                  <a:extLst>
+                    <a:ext uri="{FF2B5EF4-FFF2-40B4-BE49-F238E27FC236}">
+                      <a16:creationId xmlns:a16="http://schemas.microsoft.com/office/drawing/2014/main" id="{9AE574D3-8E43-4B5B-9F8D-E8789667DEF7}"/>
+                    </a:ext>
+                  </a:extLst>
+                </p:cNvPr>
+                <p:cNvPicPr>
+                  <a:picLocks noChangeAspect="1"/>
+                </p:cNvPicPr>
+                <p:nvPr/>
+              </p:nvPicPr>
+              <p:blipFill>
+                <a:blip r:embed="rId11"/>
+                <a:stretch>
+                  <a:fillRect/>
+                </a:stretch>
+              </p:blipFill>
+              <p:spPr>
+                <a:xfrm>
+                  <a:off x="212880" y="4684545"/>
+                  <a:ext cx="2976104" cy="1090481"/>
+                </a:xfrm>
+                <a:prstGeom prst="rect">
+                  <a:avLst/>
+                </a:prstGeom>
+              </p:spPr>
+            </p:pic>
+            <p:pic>
+              <p:nvPicPr>
+                <p:cNvPr id="28" name="Picture 27">
+                  <a:extLst>
+                    <a:ext uri="{FF2B5EF4-FFF2-40B4-BE49-F238E27FC236}">
+                      <a16:creationId xmlns:a16="http://schemas.microsoft.com/office/drawing/2014/main" id="{B86FC0AE-95FE-4574-975D-BC8F5D49061D}"/>
+                    </a:ext>
+                  </a:extLst>
+                </p:cNvPr>
+                <p:cNvPicPr>
+                  <a:picLocks/>
+                </p:cNvPicPr>
+                <p:nvPr/>
+              </p:nvPicPr>
+              <p:blipFill>
+                <a:blip r:embed="rId12"/>
+                <a:stretch>
+                  <a:fillRect/>
+                </a:stretch>
+              </p:blipFill>
+              <p:spPr>
+                <a:xfrm>
+                  <a:off x="3188984" y="4684545"/>
+                  <a:ext cx="4553712" cy="1088136"/>
+                </a:xfrm>
+                <a:prstGeom prst="rect">
+                  <a:avLst/>
+                </a:prstGeom>
+              </p:spPr>
+            </p:pic>
+            <p:pic>
+              <p:nvPicPr>
+                <p:cNvPr id="29" name="Picture 28">
+                  <a:extLst>
+                    <a:ext uri="{FF2B5EF4-FFF2-40B4-BE49-F238E27FC236}">
+                      <a16:creationId xmlns:a16="http://schemas.microsoft.com/office/drawing/2014/main" id="{4A50E249-05F1-4F7C-AC5A-36A552C955BF}"/>
+                    </a:ext>
+                  </a:extLst>
+                </p:cNvPr>
+                <p:cNvPicPr>
+                  <a:picLocks noChangeAspect="1"/>
+                </p:cNvPicPr>
+                <p:nvPr/>
+              </p:nvPicPr>
+              <p:blipFill>
+                <a:blip r:embed="rId13"/>
+                <a:stretch>
+                  <a:fillRect/>
+                </a:stretch>
+              </p:blipFill>
+              <p:spPr>
+                <a:xfrm>
+                  <a:off x="7742697" y="4684545"/>
+                  <a:ext cx="2976104" cy="1091426"/>
+                </a:xfrm>
+                <a:prstGeom prst="rect">
+                  <a:avLst/>
+                </a:prstGeom>
+              </p:spPr>
+            </p:pic>
+          </p:grpSp>
+        </p:grpSp>
+        <p:sp>
+          <p:nvSpPr>
+            <p:cNvPr id="37" name="TextBox 36">
+              <a:extLst>
+                <a:ext uri="{FF2B5EF4-FFF2-40B4-BE49-F238E27FC236}">
+                  <a16:creationId xmlns:a16="http://schemas.microsoft.com/office/drawing/2014/main" id="{19966122-AD35-41F3-8044-8A33DF38DD5D}"/>
+                </a:ext>
+              </a:extLst>
+            </p:cNvPr>
+            <p:cNvSpPr txBox="1"/>
+            <p:nvPr/>
+          </p:nvSpPr>
+          <p:spPr>
+            <a:xfrm>
+              <a:off x="1440180" y="-1850660"/>
+              <a:ext cx="2704587" cy="461665"/>
+            </a:xfrm>
+            <a:prstGeom prst="rect">
+              <a:avLst/>
+            </a:prstGeom>
+            <a:noFill/>
+          </p:spPr>
+          <p:txBody>
+            <a:bodyPr wrap="none" rtlCol="0">
+              <a:spAutoFit/>
+            </a:bodyPr>
+            <a:lstStyle/>
+            <a:p>
+              <a:r>
+                <a:rPr lang="en-US" sz="2400" dirty="0">
+                  <a:latin typeface="Times New Roman" panose="02020603050405020304" pitchFamily="18" charset="0"/>
+                  <a:cs typeface="Times New Roman" panose="02020603050405020304" pitchFamily="18" charset="0"/>
+                </a:rPr>
+                <a:t>(a) San Diego Creek</a:t>
+              </a:r>
+            </a:p>
+          </p:txBody>
+        </p:sp>
+        <p:sp>
+          <p:nvSpPr>
+            <p:cNvPr id="38" name="TextBox 37">
+              <a:extLst>
+                <a:ext uri="{FF2B5EF4-FFF2-40B4-BE49-F238E27FC236}">
+                  <a16:creationId xmlns:a16="http://schemas.microsoft.com/office/drawing/2014/main" id="{BB18733F-A42A-4723-881B-B2D0C3A358B3}"/>
+                </a:ext>
+              </a:extLst>
+            </p:cNvPr>
+            <p:cNvSpPr txBox="1"/>
+            <p:nvPr/>
+          </p:nvSpPr>
+          <p:spPr>
+            <a:xfrm>
+              <a:off x="1440180" y="4867066"/>
+              <a:ext cx="2534668" cy="461665"/>
+            </a:xfrm>
+            <a:prstGeom prst="rect">
+              <a:avLst/>
+            </a:prstGeom>
+            <a:noFill/>
+          </p:spPr>
+          <p:txBody>
+            <a:bodyPr wrap="none" rtlCol="0">
+              <a:spAutoFit/>
+            </a:bodyPr>
+            <a:lstStyle/>
+            <a:p>
+              <a:r>
+                <a:rPr lang="en-US" sz="2400" dirty="0">
+                  <a:latin typeface="Times New Roman" panose="02020603050405020304" pitchFamily="18" charset="0"/>
+                  <a:cs typeface="Times New Roman" panose="02020603050405020304" pitchFamily="18" charset="0"/>
+                </a:rPr>
+                <a:t>(b) San Juan Creek</a:t>
+              </a:r>
+            </a:p>
+          </p:txBody>
+        </p:sp>
+      </p:grpSp>
+    </p:spTree>
+    <p:extLst>
+      <p:ext uri="{BB962C8B-B14F-4D97-AF65-F5344CB8AC3E}">
+        <p14:creationId xmlns:p14="http://schemas.microsoft.com/office/powerpoint/2010/main" val="366640784"/>
+      </p:ext>
+    </p:extLst>
+  </p:cSld>
+  <p:clrMapOvr>
+    <a:masterClrMapping/>
+  </p:clrMapOvr>
+</p:sld>
+</file>
+
 <file path=ppt/theme/theme1.xml><?xml version="1.0" encoding="utf-8"?>
 <a:theme xmlns:a="http://schemas.openxmlformats.org/drawingml/2006/main" name="Office Theme">
   <a:themeElements>

</xml_diff>

<commit_message>
added DG edits to SD study
</commit_message>
<xml_diff>
--- a/figs/app_figs.pptx
+++ b/figs/app_figs.pptx
@@ -8,6 +8,7 @@
     <p:sldId id="293" r:id="rId2"/>
     <p:sldId id="349" r:id="rId3"/>
     <p:sldId id="350" r:id="rId4"/>
+    <p:sldId id="351" r:id="rId5"/>
   </p:sldIdLst>
   <p:sldSz cx="18288000" cy="6858000"/>
   <p:notesSz cx="6858000" cy="9144000"/>
@@ -245,7 +246,7 @@
           <a:p>
             <a:fld id="{71DC268A-E152-4BEA-BC4B-41FCC1567254}" type="datetimeFigureOut">
               <a:rPr lang="en-US" smtClean="0"/>
-              <a:t>4/22/2019</a:t>
+              <a:t>5/12/2019</a:t>
             </a:fld>
             <a:endParaRPr lang="en-US"/>
           </a:p>
@@ -415,7 +416,7 @@
           <a:p>
             <a:fld id="{71DC268A-E152-4BEA-BC4B-41FCC1567254}" type="datetimeFigureOut">
               <a:rPr lang="en-US" smtClean="0"/>
-              <a:t>4/22/2019</a:t>
+              <a:t>5/12/2019</a:t>
             </a:fld>
             <a:endParaRPr lang="en-US"/>
           </a:p>
@@ -595,7 +596,7 @@
           <a:p>
             <a:fld id="{71DC268A-E152-4BEA-BC4B-41FCC1567254}" type="datetimeFigureOut">
               <a:rPr lang="en-US" smtClean="0"/>
-              <a:t>4/22/2019</a:t>
+              <a:t>5/12/2019</a:t>
             </a:fld>
             <a:endParaRPr lang="en-US"/>
           </a:p>
@@ -765,7 +766,7 @@
           <a:p>
             <a:fld id="{71DC268A-E152-4BEA-BC4B-41FCC1567254}" type="datetimeFigureOut">
               <a:rPr lang="en-US" smtClean="0"/>
-              <a:t>4/22/2019</a:t>
+              <a:t>5/12/2019</a:t>
             </a:fld>
             <a:endParaRPr lang="en-US"/>
           </a:p>
@@ -1011,7 +1012,7 @@
           <a:p>
             <a:fld id="{71DC268A-E152-4BEA-BC4B-41FCC1567254}" type="datetimeFigureOut">
               <a:rPr lang="en-US" smtClean="0"/>
-              <a:t>4/22/2019</a:t>
+              <a:t>5/12/2019</a:t>
             </a:fld>
             <a:endParaRPr lang="en-US"/>
           </a:p>
@@ -1243,7 +1244,7 @@
           <a:p>
             <a:fld id="{71DC268A-E152-4BEA-BC4B-41FCC1567254}" type="datetimeFigureOut">
               <a:rPr lang="en-US" smtClean="0"/>
-              <a:t>4/22/2019</a:t>
+              <a:t>5/12/2019</a:t>
             </a:fld>
             <a:endParaRPr lang="en-US"/>
           </a:p>
@@ -1610,7 +1611,7 @@
           <a:p>
             <a:fld id="{71DC268A-E152-4BEA-BC4B-41FCC1567254}" type="datetimeFigureOut">
               <a:rPr lang="en-US" smtClean="0"/>
-              <a:t>4/22/2019</a:t>
+              <a:t>5/12/2019</a:t>
             </a:fld>
             <a:endParaRPr lang="en-US"/>
           </a:p>
@@ -1728,7 +1729,7 @@
           <a:p>
             <a:fld id="{71DC268A-E152-4BEA-BC4B-41FCC1567254}" type="datetimeFigureOut">
               <a:rPr lang="en-US" smtClean="0"/>
-              <a:t>4/22/2019</a:t>
+              <a:t>5/12/2019</a:t>
             </a:fld>
             <a:endParaRPr lang="en-US"/>
           </a:p>
@@ -1823,7 +1824,7 @@
           <a:p>
             <a:fld id="{71DC268A-E152-4BEA-BC4B-41FCC1567254}" type="datetimeFigureOut">
               <a:rPr lang="en-US" smtClean="0"/>
-              <a:t>4/22/2019</a:t>
+              <a:t>5/12/2019</a:t>
             </a:fld>
             <a:endParaRPr lang="en-US"/>
           </a:p>
@@ -2100,7 +2101,7 @@
           <a:p>
             <a:fld id="{71DC268A-E152-4BEA-BC4B-41FCC1567254}" type="datetimeFigureOut">
               <a:rPr lang="en-US" smtClean="0"/>
-              <a:t>4/22/2019</a:t>
+              <a:t>5/12/2019</a:t>
             </a:fld>
             <a:endParaRPr lang="en-US"/>
           </a:p>
@@ -2357,7 +2358,7 @@
           <a:p>
             <a:fld id="{71DC268A-E152-4BEA-BC4B-41FCC1567254}" type="datetimeFigureOut">
               <a:rPr lang="en-US" smtClean="0"/>
-              <a:t>4/22/2019</a:t>
+              <a:t>5/12/2019</a:t>
             </a:fld>
             <a:endParaRPr lang="en-US"/>
           </a:p>
@@ -2570,7 +2571,7 @@
           <a:p>
             <a:fld id="{71DC268A-E152-4BEA-BC4B-41FCC1567254}" type="datetimeFigureOut">
               <a:rPr lang="en-US" smtClean="0"/>
-              <a:t>4/22/2019</a:t>
+              <a:t>5/12/2019</a:t>
             </a:fld>
             <a:endParaRPr lang="en-US"/>
           </a:p>
@@ -5890,6 +5891,132 @@
 </p:sld>
 </file>
 
+<file path=ppt/slides/slide4.xml><?xml version="1.0" encoding="utf-8"?>
+<p:sld xmlns:a="http://schemas.openxmlformats.org/drawingml/2006/main" xmlns:r="http://schemas.openxmlformats.org/officeDocument/2006/relationships" xmlns:p="http://schemas.openxmlformats.org/presentationml/2006/main">
+  <p:cSld>
+    <p:spTree>
+      <p:nvGrpSpPr>
+        <p:cNvPr id="1" name=""/>
+        <p:cNvGrpSpPr/>
+        <p:nvPr/>
+      </p:nvGrpSpPr>
+      <p:grpSpPr>
+        <a:xfrm>
+          <a:off x="0" y="0"/>
+          <a:ext cx="0" cy="0"/>
+          <a:chOff x="0" y="0"/>
+          <a:chExt cx="0" cy="0"/>
+        </a:xfrm>
+      </p:grpSpPr>
+      <p:sp>
+        <p:nvSpPr>
+          <p:cNvPr id="2" name="Title 1">
+            <a:extLst>
+              <a:ext uri="{FF2B5EF4-FFF2-40B4-BE49-F238E27FC236}">
+                <a16:creationId xmlns:a16="http://schemas.microsoft.com/office/drawing/2014/main" id="{5BF0A1D5-037A-4B09-8D57-98DF6D2406D3}"/>
+              </a:ext>
+            </a:extLst>
+          </p:cNvPr>
+          <p:cNvSpPr>
+            <a:spLocks noGrp="1"/>
+          </p:cNvSpPr>
+          <p:nvPr>
+            <p:ph type="title"/>
+          </p:nvPr>
+        </p:nvSpPr>
+        <p:spPr/>
+        <p:txBody>
+          <a:bodyPr/>
+          <a:lstStyle/>
+          <a:p>
+            <a:endParaRPr lang="en-US"/>
+          </a:p>
+        </p:txBody>
+      </p:sp>
+      <p:pic>
+        <p:nvPicPr>
+          <p:cNvPr id="4" name="Picture 3">
+            <a:extLst>
+              <a:ext uri="{FF2B5EF4-FFF2-40B4-BE49-F238E27FC236}">
+                <a16:creationId xmlns:a16="http://schemas.microsoft.com/office/drawing/2014/main" id="{7248E853-5CE9-4E5D-ADAE-C56C8C9DE99C}"/>
+              </a:ext>
+            </a:extLst>
+          </p:cNvPr>
+          <p:cNvPicPr>
+            <a:picLocks noChangeAspect="1"/>
+          </p:cNvPicPr>
+          <p:nvPr/>
+        </p:nvPicPr>
+        <p:blipFill>
+          <a:blip r:embed="rId2">
+            <a:extLst>
+              <a:ext uri="{28A0092B-C50C-407E-A947-70E740481C1C}">
+                <a14:useLocalDpi xmlns:a14="http://schemas.microsoft.com/office/drawing/2010/main" val="0"/>
+              </a:ext>
+            </a:extLst>
+          </a:blip>
+          <a:stretch>
+            <a:fillRect/>
+          </a:stretch>
+        </p:blipFill>
+        <p:spPr>
+          <a:xfrm>
+            <a:off x="1993847" y="1690689"/>
+            <a:ext cx="5517807" cy="4138355"/>
+          </a:xfrm>
+          <a:prstGeom prst="rect">
+            <a:avLst/>
+          </a:prstGeom>
+        </p:spPr>
+      </p:pic>
+      <p:pic>
+        <p:nvPicPr>
+          <p:cNvPr id="10" name="Content Placeholder 9" descr="A picture containing outdoor, ground, sky, tree&#10;&#10;Description automatically generated">
+            <a:extLst>
+              <a:ext uri="{FF2B5EF4-FFF2-40B4-BE49-F238E27FC236}">
+                <a16:creationId xmlns:a16="http://schemas.microsoft.com/office/drawing/2014/main" id="{6F6097E0-9D41-4C02-82C6-CDEEEBD48117}"/>
+              </a:ext>
+            </a:extLst>
+          </p:cNvPr>
+          <p:cNvPicPr>
+            <a:picLocks noGrp="1"/>
+          </p:cNvPicPr>
+          <p:nvPr>
+            <p:ph idx="1"/>
+          </p:nvPr>
+        </p:nvPicPr>
+        <p:blipFill>
+          <a:blip r:embed="rId3">
+            <a:extLst>
+              <a:ext uri="{28A0092B-C50C-407E-A947-70E740481C1C}">
+                <a14:useLocalDpi xmlns:a14="http://schemas.microsoft.com/office/drawing/2010/main" val="0"/>
+              </a:ext>
+            </a:extLst>
+          </a:blip>
+          <a:stretch>
+            <a:fillRect/>
+          </a:stretch>
+        </p:blipFill>
+        <p:spPr>
+          <a:xfrm>
+            <a:off x="8248201" y="1688751"/>
+            <a:ext cx="5513832" cy="4142232"/>
+          </a:xfrm>
+        </p:spPr>
+      </p:pic>
+    </p:spTree>
+    <p:extLst>
+      <p:ext uri="{BB962C8B-B14F-4D97-AF65-F5344CB8AC3E}">
+        <p14:creationId xmlns:p14="http://schemas.microsoft.com/office/powerpoint/2010/main" val="4148071097"/>
+      </p:ext>
+    </p:extLst>
+  </p:cSld>
+  <p:clrMapOvr>
+    <a:masterClrMapping/>
+  </p:clrMapOvr>
+</p:sld>
+</file>
+
 <file path=ppt/theme/theme1.xml><?xml version="1.0" encoding="utf-8"?>
 <a:theme xmlns:a="http://schemas.openxmlformats.org/drawingml/2006/main" name="Office Theme">
   <a:themeElements>

</xml_diff>